<commit_message>
completed till kv lang
</commit_message>
<xml_diff>
--- a/talk.pptx
+++ b/talk.pptx
@@ -10,6 +10,16 @@
     <p:sldId id="258" r:id="rId4"/>
     <p:sldId id="259" r:id="rId5"/>
     <p:sldId id="260" r:id="rId6"/>
+    <p:sldId id="261" r:id="rId7"/>
+    <p:sldId id="262" r:id="rId8"/>
+    <p:sldId id="263" r:id="rId9"/>
+    <p:sldId id="264" r:id="rId10"/>
+    <p:sldId id="265" r:id="rId11"/>
+    <p:sldId id="266" r:id="rId12"/>
+    <p:sldId id="267" r:id="rId13"/>
+    <p:sldId id="268" r:id="rId14"/>
+    <p:sldId id="269" r:id="rId15"/>
+    <p:sldId id="270" r:id="rId16"/>
   </p:sldIdLst>
   <p:sldSz cx="9144000" cy="6858000" type="screen4x3"/>
   <p:notesSz cx="6858000" cy="9144000"/>
@@ -3158,6 +3168,945 @@
   <p:clrMapOvr>
     <a:masterClrMapping/>
   </p:clrMapOvr>
+  <p:timing>
+    <p:tnLst>
+      <p:par>
+        <p:cTn id="1" dur="indefinite" restart="never" nodeType="tmRoot"/>
+      </p:par>
+    </p:tnLst>
+  </p:timing>
+</p:sld>
+</file>
+
+<file path=ppt/slides/slide10.xml><?xml version="1.0" encoding="utf-8"?>
+<p:sld xmlns:a="http://schemas.openxmlformats.org/drawingml/2006/main" xmlns:r="http://schemas.openxmlformats.org/officeDocument/2006/relationships" xmlns:p="http://schemas.openxmlformats.org/presentationml/2006/main">
+  <p:cSld>
+    <p:spTree>
+      <p:nvGrpSpPr>
+        <p:cNvPr id="1" name=""/>
+        <p:cNvGrpSpPr/>
+        <p:nvPr/>
+      </p:nvGrpSpPr>
+      <p:grpSpPr>
+        <a:xfrm>
+          <a:off x="0" y="0"/>
+          <a:ext cx="0" cy="0"/>
+          <a:chOff x="0" y="0"/>
+          <a:chExt cx="0" cy="0"/>
+        </a:xfrm>
+      </p:grpSpPr>
+      <p:sp>
+        <p:nvSpPr>
+          <p:cNvPr id="2" name="Title 1"/>
+          <p:cNvSpPr>
+            <a:spLocks noGrp="1"/>
+          </p:cNvSpPr>
+          <p:nvPr>
+            <p:ph type="title"/>
+          </p:nvPr>
+        </p:nvSpPr>
+        <p:spPr/>
+        <p:txBody>
+          <a:bodyPr/>
+          <a:lstStyle/>
+          <a:p>
+            <a:r>
+              <a:rPr lang="en-US" dirty="0" smtClean="0"/>
+              <a:t>Layouts</a:t>
+            </a:r>
+            <a:endParaRPr lang="en-IN" dirty="0"/>
+          </a:p>
+        </p:txBody>
+      </p:sp>
+      <p:sp>
+        <p:nvSpPr>
+          <p:cNvPr id="3" name="Content Placeholder 2"/>
+          <p:cNvSpPr>
+            <a:spLocks noGrp="1"/>
+          </p:cNvSpPr>
+          <p:nvPr>
+            <p:ph idx="1"/>
+          </p:nvPr>
+        </p:nvSpPr>
+        <p:spPr/>
+        <p:txBody>
+          <a:bodyPr>
+            <a:normAutofit fontScale="92500" lnSpcReduction="10000"/>
+          </a:bodyPr>
+          <a:lstStyle/>
+          <a:p>
+            <a:r>
+              <a:rPr lang="en-GB" dirty="0" smtClean="0"/>
+              <a:t>layout</a:t>
+            </a:r>
+            <a:r>
+              <a:rPr lang="en-GB" dirty="0"/>
+              <a:t> is a special kind of widget that controls the size and position of its children</a:t>
+            </a:r>
+            <a:r>
+              <a:rPr lang="en-GB" dirty="0" smtClean="0"/>
+              <a:t>.</a:t>
+            </a:r>
+          </a:p>
+          <a:p>
+            <a:r>
+              <a:rPr lang="en-IN" dirty="0"/>
+              <a:t> </a:t>
+            </a:r>
+            <a:r>
+              <a:rPr lang="en-IN" dirty="0" err="1" smtClean="0"/>
+              <a:t>size_hint</a:t>
+            </a:r>
+            <a:r>
+              <a:rPr lang="en-IN" dirty="0"/>
+              <a:t> and </a:t>
+            </a:r>
+            <a:r>
+              <a:rPr lang="en-IN" dirty="0" err="1" smtClean="0"/>
+              <a:t>pos_hint</a:t>
+            </a:r>
+            <a:r>
+              <a:rPr lang="en-IN" dirty="0" smtClean="0"/>
+              <a:t> for size and pos.</a:t>
+            </a:r>
+          </a:p>
+          <a:p>
+            <a:r>
+              <a:rPr lang="en-US" dirty="0" err="1" smtClean="0"/>
+              <a:t>BoxLayout</a:t>
+            </a:r>
+            <a:endParaRPr lang="en-US" dirty="0" smtClean="0"/>
+          </a:p>
+          <a:p>
+            <a:r>
+              <a:rPr lang="en-US" dirty="0" err="1" smtClean="0"/>
+              <a:t>GridLayout</a:t>
+            </a:r>
+            <a:endParaRPr lang="en-US" dirty="0" smtClean="0"/>
+          </a:p>
+          <a:p>
+            <a:r>
+              <a:rPr lang="en-US" dirty="0" err="1" smtClean="0"/>
+              <a:t>StackLayout</a:t>
+            </a:r>
+            <a:endParaRPr lang="en-US" dirty="0" smtClean="0"/>
+          </a:p>
+          <a:p>
+            <a:r>
+              <a:rPr lang="en-US" dirty="0" err="1" smtClean="0"/>
+              <a:t>AnchorLayout</a:t>
+            </a:r>
+            <a:endParaRPr lang="en-US" dirty="0" smtClean="0"/>
+          </a:p>
+          <a:p>
+            <a:r>
+              <a:rPr lang="en-US" dirty="0" err="1" smtClean="0"/>
+              <a:t>FloatLayout</a:t>
+            </a:r>
+            <a:endParaRPr lang="en-US" dirty="0" smtClean="0"/>
+          </a:p>
+          <a:p>
+            <a:r>
+              <a:rPr lang="en-GB" dirty="0"/>
+              <a:t>Available units are </a:t>
+            </a:r>
+            <a:r>
+              <a:rPr lang="en-GB" dirty="0" err="1" smtClean="0"/>
+              <a:t>pt</a:t>
+            </a:r>
+            <a:r>
+              <a:rPr lang="en-GB" dirty="0" smtClean="0"/>
+              <a:t>,</a:t>
+            </a:r>
+            <a:r>
+              <a:rPr lang="en-GB" dirty="0"/>
+              <a:t> </a:t>
+            </a:r>
+            <a:r>
+              <a:rPr lang="en-GB" dirty="0" smtClean="0"/>
+              <a:t>mm,</a:t>
+            </a:r>
+            <a:r>
+              <a:rPr lang="en-GB" dirty="0"/>
+              <a:t> </a:t>
+            </a:r>
+            <a:r>
+              <a:rPr lang="en-GB" dirty="0" smtClean="0"/>
+              <a:t>cm,</a:t>
+            </a:r>
+            <a:r>
+              <a:rPr lang="en-GB" dirty="0"/>
+              <a:t> </a:t>
+            </a:r>
+            <a:r>
+              <a:rPr lang="en-GB" dirty="0" smtClean="0"/>
+              <a:t>inch,</a:t>
+            </a:r>
+            <a:r>
+              <a:rPr lang="en-GB" dirty="0"/>
+              <a:t> </a:t>
+            </a:r>
+            <a:r>
+              <a:rPr lang="en-GB" dirty="0" err="1" smtClean="0"/>
+              <a:t>dp</a:t>
+            </a:r>
+            <a:r>
+              <a:rPr lang="en-GB" dirty="0"/>
+              <a:t> and </a:t>
+            </a:r>
+            <a:r>
+              <a:rPr lang="en-GB" dirty="0" smtClean="0"/>
+              <a:t>sp.</a:t>
+            </a:r>
+            <a:endParaRPr lang="en-IN" dirty="0" smtClean="0"/>
+          </a:p>
+          <a:p>
+            <a:endParaRPr lang="en-IN" dirty="0"/>
+          </a:p>
+        </p:txBody>
+      </p:sp>
+    </p:spTree>
+    <p:extLst>
+      <p:ext uri="{BB962C8B-B14F-4D97-AF65-F5344CB8AC3E}">
+        <p14:creationId xmlns:p14="http://schemas.microsoft.com/office/powerpoint/2010/main" val="4110600515"/>
+      </p:ext>
+    </p:extLst>
+  </p:cSld>
+  <p:clrMapOvr>
+    <a:masterClrMapping/>
+  </p:clrMapOvr>
+  <p:timing>
+    <p:tnLst>
+      <p:par>
+        <p:cTn id="1" dur="indefinite" restart="never" nodeType="tmRoot"/>
+      </p:par>
+    </p:tnLst>
+  </p:timing>
+</p:sld>
+</file>
+
+<file path=ppt/slides/slide11.xml><?xml version="1.0" encoding="utf-8"?>
+<p:sld xmlns:a="http://schemas.openxmlformats.org/drawingml/2006/main" xmlns:r="http://schemas.openxmlformats.org/officeDocument/2006/relationships" xmlns:p="http://schemas.openxmlformats.org/presentationml/2006/main">
+  <p:cSld>
+    <p:spTree>
+      <p:nvGrpSpPr>
+        <p:cNvPr id="1" name=""/>
+        <p:cNvGrpSpPr/>
+        <p:nvPr/>
+      </p:nvGrpSpPr>
+      <p:grpSpPr>
+        <a:xfrm>
+          <a:off x="0" y="0"/>
+          <a:ext cx="0" cy="0"/>
+          <a:chOff x="0" y="0"/>
+          <a:chExt cx="0" cy="0"/>
+        </a:xfrm>
+      </p:grpSpPr>
+      <p:sp>
+        <p:nvSpPr>
+          <p:cNvPr id="2" name="Title 1"/>
+          <p:cNvSpPr>
+            <a:spLocks noGrp="1"/>
+          </p:cNvSpPr>
+          <p:nvPr>
+            <p:ph type="title"/>
+          </p:nvPr>
+        </p:nvSpPr>
+        <p:spPr/>
+        <p:txBody>
+          <a:bodyPr/>
+          <a:lstStyle/>
+          <a:p>
+            <a:r>
+              <a:rPr lang="en-US" dirty="0" smtClean="0"/>
+              <a:t>UIX widgets</a:t>
+            </a:r>
+            <a:endParaRPr lang="en-IN" dirty="0"/>
+          </a:p>
+        </p:txBody>
+      </p:sp>
+      <p:sp>
+        <p:nvSpPr>
+          <p:cNvPr id="3" name="Content Placeholder 2"/>
+          <p:cNvSpPr>
+            <a:spLocks noGrp="1"/>
+          </p:cNvSpPr>
+          <p:nvPr>
+            <p:ph idx="1"/>
+          </p:nvPr>
+        </p:nvSpPr>
+        <p:spPr/>
+        <p:txBody>
+          <a:bodyPr/>
+          <a:lstStyle/>
+          <a:p>
+            <a:r>
+              <a:rPr lang="en-US" dirty="0" smtClean="0"/>
+              <a:t>Button</a:t>
+            </a:r>
+          </a:p>
+          <a:p>
+            <a:r>
+              <a:rPr lang="en-US" dirty="0" smtClean="0"/>
+              <a:t>Label</a:t>
+            </a:r>
+          </a:p>
+          <a:p>
+            <a:r>
+              <a:rPr lang="en-US" dirty="0" smtClean="0"/>
+              <a:t>Progress Bar</a:t>
+            </a:r>
+          </a:p>
+          <a:p>
+            <a:r>
+              <a:rPr lang="en-US" dirty="0" smtClean="0"/>
+              <a:t>Text</a:t>
+            </a:r>
+          </a:p>
+          <a:p>
+            <a:r>
+              <a:rPr lang="en-US" dirty="0" smtClean="0"/>
+              <a:t>File Chooser</a:t>
+            </a:r>
+          </a:p>
+          <a:p>
+            <a:r>
+              <a:rPr lang="en-US" dirty="0" smtClean="0"/>
+              <a:t>Canvas</a:t>
+            </a:r>
+          </a:p>
+          <a:p>
+            <a:pPr lvl="1"/>
+            <a:endParaRPr lang="en-IN" dirty="0"/>
+          </a:p>
+        </p:txBody>
+      </p:sp>
+    </p:spTree>
+    <p:extLst>
+      <p:ext uri="{BB962C8B-B14F-4D97-AF65-F5344CB8AC3E}">
+        <p14:creationId xmlns:p14="http://schemas.microsoft.com/office/powerpoint/2010/main" val="3423266386"/>
+      </p:ext>
+    </p:extLst>
+  </p:cSld>
+  <p:clrMapOvr>
+    <a:masterClrMapping/>
+  </p:clrMapOvr>
+</p:sld>
+</file>
+
+<file path=ppt/slides/slide12.xml><?xml version="1.0" encoding="utf-8"?>
+<p:sld xmlns:a="http://schemas.openxmlformats.org/drawingml/2006/main" xmlns:r="http://schemas.openxmlformats.org/officeDocument/2006/relationships" xmlns:p="http://schemas.openxmlformats.org/presentationml/2006/main">
+  <p:cSld>
+    <p:spTree>
+      <p:nvGrpSpPr>
+        <p:cNvPr id="1" name=""/>
+        <p:cNvGrpSpPr/>
+        <p:nvPr/>
+      </p:nvGrpSpPr>
+      <p:grpSpPr>
+        <a:xfrm>
+          <a:off x="0" y="0"/>
+          <a:ext cx="0" cy="0"/>
+          <a:chOff x="0" y="0"/>
+          <a:chExt cx="0" cy="0"/>
+        </a:xfrm>
+      </p:grpSpPr>
+      <p:sp>
+        <p:nvSpPr>
+          <p:cNvPr id="2" name="Title 1"/>
+          <p:cNvSpPr>
+            <a:spLocks noGrp="1"/>
+          </p:cNvSpPr>
+          <p:nvPr>
+            <p:ph type="title"/>
+          </p:nvPr>
+        </p:nvSpPr>
+        <p:spPr/>
+        <p:txBody>
+          <a:bodyPr/>
+          <a:lstStyle/>
+          <a:p>
+            <a:r>
+              <a:rPr lang="en-US" dirty="0" smtClean="0"/>
+              <a:t>Debugging</a:t>
+            </a:r>
+            <a:endParaRPr lang="en-IN" dirty="0"/>
+          </a:p>
+        </p:txBody>
+      </p:sp>
+      <p:sp>
+        <p:nvSpPr>
+          <p:cNvPr id="3" name="Content Placeholder 2"/>
+          <p:cNvSpPr>
+            <a:spLocks noGrp="1"/>
+          </p:cNvSpPr>
+          <p:nvPr>
+            <p:ph idx="1"/>
+          </p:nvPr>
+        </p:nvSpPr>
+        <p:spPr/>
+        <p:txBody>
+          <a:bodyPr/>
+          <a:lstStyle/>
+          <a:p>
+            <a:r>
+              <a:rPr lang="en-US" dirty="0" smtClean="0"/>
+              <a:t>Use dotted lines.</a:t>
+            </a:r>
+          </a:p>
+          <a:p>
+            <a:r>
+              <a:rPr lang="en-US" dirty="0" smtClean="0"/>
+              <a:t>Open </a:t>
+            </a:r>
+            <a:r>
+              <a:rPr lang="en-US" dirty="0" err="1" smtClean="0"/>
+              <a:t>kivy</a:t>
+            </a:r>
+            <a:r>
+              <a:rPr lang="en-US" dirty="0" smtClean="0"/>
+              <a:t> app in debug mode.</a:t>
+            </a:r>
+            <a:endParaRPr lang="en-IN" dirty="0"/>
+          </a:p>
+        </p:txBody>
+      </p:sp>
+    </p:spTree>
+    <p:extLst>
+      <p:ext uri="{BB962C8B-B14F-4D97-AF65-F5344CB8AC3E}">
+        <p14:creationId xmlns:p14="http://schemas.microsoft.com/office/powerpoint/2010/main" val="1855198409"/>
+      </p:ext>
+    </p:extLst>
+  </p:cSld>
+  <p:clrMapOvr>
+    <a:masterClrMapping/>
+  </p:clrMapOvr>
+</p:sld>
+</file>
+
+<file path=ppt/slides/slide13.xml><?xml version="1.0" encoding="utf-8"?>
+<p:sld xmlns:a="http://schemas.openxmlformats.org/drawingml/2006/main" xmlns:r="http://schemas.openxmlformats.org/officeDocument/2006/relationships" xmlns:p="http://schemas.openxmlformats.org/presentationml/2006/main">
+  <p:cSld>
+    <p:spTree>
+      <p:nvGrpSpPr>
+        <p:cNvPr id="1" name=""/>
+        <p:cNvGrpSpPr/>
+        <p:nvPr/>
+      </p:nvGrpSpPr>
+      <p:grpSpPr>
+        <a:xfrm>
+          <a:off x="0" y="0"/>
+          <a:ext cx="0" cy="0"/>
+          <a:chOff x="0" y="0"/>
+          <a:chExt cx="0" cy="0"/>
+        </a:xfrm>
+      </p:grpSpPr>
+      <p:sp>
+        <p:nvSpPr>
+          <p:cNvPr id="2" name="Title 1"/>
+          <p:cNvSpPr>
+            <a:spLocks noGrp="1"/>
+          </p:cNvSpPr>
+          <p:nvPr>
+            <p:ph type="ctrTitle"/>
+          </p:nvPr>
+        </p:nvSpPr>
+        <p:spPr>
+          <a:xfrm>
+            <a:off x="683568" y="2420888"/>
+            <a:ext cx="7772400" cy="1470025"/>
+          </a:xfrm>
+        </p:spPr>
+        <p:txBody>
+          <a:bodyPr/>
+          <a:lstStyle/>
+          <a:p>
+            <a:r>
+              <a:rPr lang="en-US" dirty="0" smtClean="0"/>
+              <a:t>KV language</a:t>
+            </a:r>
+            <a:endParaRPr lang="en-IN" dirty="0"/>
+          </a:p>
+        </p:txBody>
+      </p:sp>
+      <p:sp>
+        <p:nvSpPr>
+          <p:cNvPr id="3" name="Subtitle 2"/>
+          <p:cNvSpPr>
+            <a:spLocks noGrp="1"/>
+          </p:cNvSpPr>
+          <p:nvPr>
+            <p:ph type="subTitle" idx="1"/>
+          </p:nvPr>
+        </p:nvSpPr>
+        <p:spPr/>
+        <p:txBody>
+          <a:bodyPr/>
+          <a:lstStyle/>
+          <a:p>
+            <a:endParaRPr lang="en-IN"/>
+          </a:p>
+        </p:txBody>
+      </p:sp>
+    </p:spTree>
+    <p:extLst>
+      <p:ext uri="{BB962C8B-B14F-4D97-AF65-F5344CB8AC3E}">
+        <p14:creationId xmlns:p14="http://schemas.microsoft.com/office/powerpoint/2010/main" val="1131209944"/>
+      </p:ext>
+    </p:extLst>
+  </p:cSld>
+  <p:clrMapOvr>
+    <a:masterClrMapping/>
+  </p:clrMapOvr>
+</p:sld>
+</file>
+
+<file path=ppt/slides/slide14.xml><?xml version="1.0" encoding="utf-8"?>
+<p:sld xmlns:a="http://schemas.openxmlformats.org/drawingml/2006/main" xmlns:r="http://schemas.openxmlformats.org/officeDocument/2006/relationships" xmlns:p="http://schemas.openxmlformats.org/presentationml/2006/main">
+  <p:cSld>
+    <p:spTree>
+      <p:nvGrpSpPr>
+        <p:cNvPr id="1" name=""/>
+        <p:cNvGrpSpPr/>
+        <p:nvPr/>
+      </p:nvGrpSpPr>
+      <p:grpSpPr>
+        <a:xfrm>
+          <a:off x="0" y="0"/>
+          <a:ext cx="0" cy="0"/>
+          <a:chOff x="0" y="0"/>
+          <a:chExt cx="0" cy="0"/>
+        </a:xfrm>
+      </p:grpSpPr>
+      <p:sp>
+        <p:nvSpPr>
+          <p:cNvPr id="2" name="Title 1"/>
+          <p:cNvSpPr>
+            <a:spLocks noGrp="1"/>
+          </p:cNvSpPr>
+          <p:nvPr>
+            <p:ph type="title"/>
+          </p:nvPr>
+        </p:nvSpPr>
+        <p:spPr/>
+        <p:txBody>
+          <a:bodyPr>
+            <a:normAutofit/>
+          </a:bodyPr>
+          <a:lstStyle/>
+          <a:p>
+            <a:r>
+              <a:rPr lang="en-IN" dirty="0"/>
+              <a:t>How to load </a:t>
+            </a:r>
+            <a:r>
+              <a:rPr lang="en-IN" dirty="0" smtClean="0"/>
+              <a:t>KV</a:t>
+            </a:r>
+            <a:endParaRPr lang="en-IN" dirty="0"/>
+          </a:p>
+        </p:txBody>
+      </p:sp>
+      <p:sp>
+        <p:nvSpPr>
+          <p:cNvPr id="3" name="Content Placeholder 2"/>
+          <p:cNvSpPr>
+            <a:spLocks noGrp="1"/>
+          </p:cNvSpPr>
+          <p:nvPr>
+            <p:ph idx="1"/>
+          </p:nvPr>
+        </p:nvSpPr>
+        <p:spPr/>
+        <p:txBody>
+          <a:bodyPr/>
+          <a:lstStyle/>
+          <a:p>
+            <a:r>
+              <a:rPr lang="en-IN" dirty="0"/>
+              <a:t>N</a:t>
+            </a:r>
+            <a:r>
+              <a:rPr lang="en-IN" dirty="0" smtClean="0"/>
+              <a:t>ame </a:t>
+            </a:r>
+            <a:r>
+              <a:rPr lang="en-IN" dirty="0"/>
+              <a:t>convention</a:t>
+            </a:r>
+            <a:r>
+              <a:rPr lang="en-IN" dirty="0" smtClean="0"/>
+              <a:t>:</a:t>
+            </a:r>
+          </a:p>
+          <a:p>
+            <a:pPr marL="0" indent="0">
+              <a:buNone/>
+            </a:pPr>
+            <a:r>
+              <a:rPr lang="en-GB" dirty="0"/>
+              <a:t>	</a:t>
+            </a:r>
+            <a:r>
+              <a:rPr lang="en-GB" sz="2800" dirty="0" smtClean="0"/>
+              <a:t>Kivy </a:t>
+            </a:r>
+            <a:r>
+              <a:rPr lang="en-GB" sz="2800" dirty="0"/>
+              <a:t>looks for a </a:t>
+            </a:r>
+            <a:r>
+              <a:rPr lang="en-GB" sz="2800" dirty="0" err="1"/>
+              <a:t>Kv</a:t>
+            </a:r>
+            <a:r>
+              <a:rPr lang="en-GB" sz="2800" dirty="0"/>
+              <a:t> file with the same name </a:t>
+            </a:r>
+            <a:r>
+              <a:rPr lang="en-GB" sz="2800" dirty="0" smtClean="0"/>
+              <a:t>	as 	your </a:t>
+            </a:r>
+            <a:r>
+              <a:rPr lang="en-GB" sz="2800" dirty="0"/>
+              <a:t>App class in lowercase, minus </a:t>
+            </a:r>
+            <a:r>
+              <a:rPr lang="en-GB" sz="2800" dirty="0" smtClean="0"/>
+              <a:t>	“</a:t>
+            </a:r>
+            <a:r>
+              <a:rPr lang="en-GB" sz="2800" dirty="0"/>
+              <a:t>App” if it </a:t>
+            </a:r>
+            <a:r>
+              <a:rPr lang="en-GB" sz="2800" dirty="0" smtClean="0"/>
+              <a:t>	ends </a:t>
+            </a:r>
+            <a:r>
+              <a:rPr lang="en-GB" sz="2800" dirty="0"/>
+              <a:t>with ‘App’ </a:t>
+            </a:r>
+            <a:endParaRPr lang="en-GB" sz="2800" dirty="0" smtClean="0"/>
+          </a:p>
+          <a:p>
+            <a:pPr marL="0" indent="0">
+              <a:buNone/>
+            </a:pPr>
+            <a:r>
+              <a:rPr lang="en-GB" sz="2800" dirty="0"/>
+              <a:t>	</a:t>
+            </a:r>
+            <a:r>
+              <a:rPr lang="en-GB" sz="2800" dirty="0" err="1" smtClean="0"/>
+              <a:t>e.g</a:t>
+            </a:r>
+            <a:r>
+              <a:rPr lang="en-GB" sz="2800" dirty="0" smtClean="0"/>
+              <a:t>: </a:t>
+            </a:r>
+            <a:r>
+              <a:rPr lang="en-GB" sz="2800" dirty="0" err="1" smtClean="0"/>
+              <a:t>MyApp</a:t>
+            </a:r>
+            <a:r>
+              <a:rPr lang="en-GB" sz="2800" dirty="0" smtClean="0"/>
+              <a:t> </a:t>
+            </a:r>
+            <a:r>
+              <a:rPr lang="en-GB" sz="2800" dirty="0"/>
+              <a:t>-&gt; </a:t>
+            </a:r>
+            <a:r>
+              <a:rPr lang="en-GB" sz="2800" dirty="0" err="1" smtClean="0"/>
+              <a:t>my.kv</a:t>
+            </a:r>
+            <a:endParaRPr lang="en-GB" sz="2800" dirty="0" smtClean="0"/>
+          </a:p>
+          <a:p>
+            <a:r>
+              <a:rPr lang="en-IN" dirty="0" smtClean="0"/>
+              <a:t>Builder</a:t>
+            </a:r>
+            <a:r>
+              <a:rPr lang="en-IN" dirty="0"/>
+              <a:t>:</a:t>
+            </a:r>
+            <a:endParaRPr lang="en-GB" dirty="0"/>
+          </a:p>
+          <a:p>
+            <a:pPr marL="914400" lvl="2" indent="0">
+              <a:buNone/>
+            </a:pPr>
+            <a:r>
+              <a:rPr lang="en-GB" sz="2800" dirty="0"/>
+              <a:t>You can tell Kivy to directly load a string or a file</a:t>
+            </a:r>
+            <a:r>
+              <a:rPr lang="en-GB" sz="2800" dirty="0" smtClean="0"/>
+              <a:t>.</a:t>
+            </a:r>
+          </a:p>
+          <a:p>
+            <a:pPr marL="914400" lvl="2" indent="0">
+              <a:buNone/>
+            </a:pPr>
+            <a:r>
+              <a:rPr lang="en-IN" sz="2800" dirty="0" err="1"/>
+              <a:t>Builder.load_file</a:t>
+            </a:r>
+            <a:r>
+              <a:rPr lang="en-IN" sz="2800" b="1" dirty="0"/>
+              <a:t>(</a:t>
+            </a:r>
+            <a:r>
+              <a:rPr lang="en-IN" sz="2800" dirty="0"/>
+              <a:t>'path/to/</a:t>
+            </a:r>
+            <a:r>
+              <a:rPr lang="en-IN" sz="2800" dirty="0" err="1"/>
+              <a:t>file.kv</a:t>
+            </a:r>
+            <a:r>
+              <a:rPr lang="en-IN" sz="2800" dirty="0"/>
+              <a:t>'</a:t>
+            </a:r>
+            <a:r>
+              <a:rPr lang="en-IN" sz="2800" b="1" dirty="0"/>
+              <a:t>)</a:t>
+            </a:r>
+            <a:endParaRPr lang="en-IN" sz="2800" dirty="0"/>
+          </a:p>
+        </p:txBody>
+      </p:sp>
+    </p:spTree>
+    <p:extLst>
+      <p:ext uri="{BB962C8B-B14F-4D97-AF65-F5344CB8AC3E}">
+        <p14:creationId xmlns:p14="http://schemas.microsoft.com/office/powerpoint/2010/main" val="3787521781"/>
+      </p:ext>
+    </p:extLst>
+  </p:cSld>
+  <p:clrMapOvr>
+    <a:masterClrMapping/>
+  </p:clrMapOvr>
+</p:sld>
+</file>
+
+<file path=ppt/slides/slide15.xml><?xml version="1.0" encoding="utf-8"?>
+<p:sld xmlns:a="http://schemas.openxmlformats.org/drawingml/2006/main" xmlns:r="http://schemas.openxmlformats.org/officeDocument/2006/relationships" xmlns:p="http://schemas.openxmlformats.org/presentationml/2006/main">
+  <p:cSld>
+    <p:spTree>
+      <p:nvGrpSpPr>
+        <p:cNvPr id="1" name=""/>
+        <p:cNvGrpSpPr/>
+        <p:nvPr/>
+      </p:nvGrpSpPr>
+      <p:grpSpPr>
+        <a:xfrm>
+          <a:off x="0" y="0"/>
+          <a:ext cx="0" cy="0"/>
+          <a:chOff x="0" y="0"/>
+          <a:chExt cx="0" cy="0"/>
+        </a:xfrm>
+      </p:grpSpPr>
+      <p:sp>
+        <p:nvSpPr>
+          <p:cNvPr id="2" name="Title 1"/>
+          <p:cNvSpPr>
+            <a:spLocks noGrp="1"/>
+          </p:cNvSpPr>
+          <p:nvPr>
+            <p:ph type="title"/>
+          </p:nvPr>
+        </p:nvSpPr>
+        <p:spPr/>
+        <p:txBody>
+          <a:bodyPr/>
+          <a:lstStyle/>
+          <a:p>
+            <a:r>
+              <a:rPr lang="en-US" smtClean="0"/>
+              <a:t>Understanding </a:t>
+            </a:r>
+            <a:r>
+              <a:rPr lang="en-US" dirty="0" smtClean="0"/>
+              <a:t>&lt;&gt;</a:t>
+            </a:r>
+            <a:endParaRPr lang="en-IN" dirty="0"/>
+          </a:p>
+        </p:txBody>
+      </p:sp>
+      <p:sp>
+        <p:nvSpPr>
+          <p:cNvPr id="3" name="Content Placeholder 2"/>
+          <p:cNvSpPr>
+            <a:spLocks noGrp="1"/>
+          </p:cNvSpPr>
+          <p:nvPr>
+            <p:ph idx="1"/>
+          </p:nvPr>
+        </p:nvSpPr>
+        <p:spPr/>
+        <p:txBody>
+          <a:bodyPr>
+            <a:normAutofit fontScale="92500" lnSpcReduction="20000"/>
+          </a:bodyPr>
+          <a:lstStyle/>
+          <a:p>
+            <a:r>
+              <a:rPr lang="en-IN" dirty="0" smtClean="0"/>
+              <a:t>Widget</a:t>
+            </a:r>
+            <a:endParaRPr lang="en-IN" b="1" dirty="0" smtClean="0"/>
+          </a:p>
+          <a:p>
+            <a:r>
+              <a:rPr lang="en-IN" dirty="0" smtClean="0"/>
+              <a:t>&lt;</a:t>
+            </a:r>
+            <a:r>
+              <a:rPr lang="en-IN" dirty="0" err="1" smtClean="0"/>
+              <a:t>MyWidget</a:t>
+            </a:r>
+            <a:r>
+              <a:rPr lang="en-IN" dirty="0" smtClean="0"/>
+              <a:t>&gt;</a:t>
+            </a:r>
+            <a:endParaRPr lang="en-IN" b="1" dirty="0"/>
+          </a:p>
+          <a:p>
+            <a:r>
+              <a:rPr lang="en-US" dirty="0" smtClean="0"/>
+              <a:t>App, root, self</a:t>
+            </a:r>
+          </a:p>
+          <a:p>
+            <a:endParaRPr lang="en-US" dirty="0" smtClean="0"/>
+          </a:p>
+          <a:p>
+            <a:endParaRPr lang="en-US" dirty="0" smtClean="0"/>
+          </a:p>
+          <a:p>
+            <a:r>
+              <a:rPr lang="en-US" dirty="0" smtClean="0"/>
+              <a:t>Code in </a:t>
+            </a:r>
+            <a:r>
+              <a:rPr lang="en-US" dirty="0" err="1" smtClean="0"/>
+              <a:t>kv</a:t>
+            </a:r>
+            <a:r>
+              <a:rPr lang="en-US" dirty="0" smtClean="0"/>
+              <a:t> language:</a:t>
+            </a:r>
+          </a:p>
+          <a:p>
+            <a:endParaRPr lang="en-US" dirty="0"/>
+          </a:p>
+          <a:p>
+            <a:endParaRPr lang="en-US" dirty="0" smtClean="0"/>
+          </a:p>
+          <a:p>
+            <a:r>
+              <a:rPr lang="en-US" dirty="0" smtClean="0"/>
+              <a:t>Equivalent code in python:</a:t>
+            </a:r>
+            <a:endParaRPr lang="en-IN" dirty="0"/>
+          </a:p>
+        </p:txBody>
+      </p:sp>
+      <p:pic>
+        <p:nvPicPr>
+          <p:cNvPr id="1028" name="Picture 4" descr="C:\Users\Rakesh\Desktop\pyconsk\py-code.png"/>
+          <p:cNvPicPr>
+            <a:picLocks noChangeAspect="1" noChangeArrowheads="1"/>
+          </p:cNvPicPr>
+          <p:nvPr/>
+        </p:nvPicPr>
+        <p:blipFill>
+          <a:blip r:embed="rId2">
+            <a:extLst>
+              <a:ext uri="{28A0092B-C50C-407E-A947-70E740481C1C}">
+                <a14:useLocalDpi xmlns:a14="http://schemas.microsoft.com/office/drawing/2010/main" val="0"/>
+              </a:ext>
+            </a:extLst>
+          </a:blip>
+          <a:srcRect/>
+          <a:stretch>
+            <a:fillRect/>
+          </a:stretch>
+        </p:blipFill>
+        <p:spPr bwMode="auto">
+          <a:xfrm>
+            <a:off x="5364088" y="4869160"/>
+            <a:ext cx="2741770" cy="1655170"/>
+          </a:xfrm>
+          <a:prstGeom prst="rect">
+            <a:avLst/>
+          </a:prstGeom>
+          <a:noFill/>
+          <a:extLst>
+            <a:ext uri="{909E8E84-426E-40DD-AFC4-6F175D3DCCD1}">
+              <a14:hiddenFill xmlns:a14="http://schemas.microsoft.com/office/drawing/2010/main">
+                <a:solidFill>
+                  <a:srgbClr val="FFFFFF"/>
+                </a:solidFill>
+              </a14:hiddenFill>
+            </a:ext>
+          </a:extLst>
+        </p:spPr>
+      </p:pic>
+      <p:pic>
+        <p:nvPicPr>
+          <p:cNvPr id="1029" name="Picture 5" descr="C:\Users\Rakesh\Desktop\pyconsk\kv-lang.png"/>
+          <p:cNvPicPr>
+            <a:picLocks noChangeAspect="1" noChangeArrowheads="1"/>
+          </p:cNvPicPr>
+          <p:nvPr/>
+        </p:nvPicPr>
+        <p:blipFill>
+          <a:blip r:embed="rId3">
+            <a:extLst>
+              <a:ext uri="{28A0092B-C50C-407E-A947-70E740481C1C}">
+                <a14:useLocalDpi xmlns:a14="http://schemas.microsoft.com/office/drawing/2010/main" val="0"/>
+              </a:ext>
+            </a:extLst>
+          </a:blip>
+          <a:srcRect/>
+          <a:stretch>
+            <a:fillRect/>
+          </a:stretch>
+        </p:blipFill>
+        <p:spPr bwMode="auto">
+          <a:xfrm>
+            <a:off x="5661990" y="2996952"/>
+            <a:ext cx="2160240" cy="1642999"/>
+          </a:xfrm>
+          <a:prstGeom prst="rect">
+            <a:avLst/>
+          </a:prstGeom>
+          <a:noFill/>
+          <a:extLst>
+            <a:ext uri="{909E8E84-426E-40DD-AFC4-6F175D3DCCD1}">
+              <a14:hiddenFill xmlns:a14="http://schemas.microsoft.com/office/drawing/2010/main">
+                <a:solidFill>
+                  <a:srgbClr val="FFFFFF"/>
+                </a:solidFill>
+              </a14:hiddenFill>
+            </a:ext>
+          </a:extLst>
+        </p:spPr>
+      </p:pic>
+    </p:spTree>
+    <p:extLst>
+      <p:ext uri="{BB962C8B-B14F-4D97-AF65-F5344CB8AC3E}">
+        <p14:creationId xmlns:p14="http://schemas.microsoft.com/office/powerpoint/2010/main" val="4272866179"/>
+      </p:ext>
+    </p:extLst>
+  </p:cSld>
+  <p:clrMapOvr>
+    <a:masterClrMapping/>
+  </p:clrMapOvr>
 </p:sld>
 </file>
 
@@ -3195,11 +4144,7 @@
           <a:p>
             <a:r>
               <a:rPr lang="en-US" dirty="0" smtClean="0"/>
-              <a:t>Why </a:t>
-            </a:r>
-            <a:r>
-              <a:rPr lang="en-US" dirty="0" err="1" smtClean="0"/>
-              <a:t>Kivy</a:t>
+              <a:t>Why Kivy</a:t>
             </a:r>
             <a:r>
               <a:rPr lang="en-US" dirty="0"/>
@@ -3225,12 +4170,8 @@
           <a:lstStyle/>
           <a:p>
             <a:r>
-              <a:rPr lang="en-US" dirty="0" err="1" smtClean="0"/>
-              <a:t>Kivy</a:t>
-            </a:r>
-            <a:r>
               <a:rPr lang="en-US" dirty="0" smtClean="0"/>
-              <a:t> is platform independent!</a:t>
+              <a:t>Kivy is platform independent!</a:t>
             </a:r>
           </a:p>
           <a:p>
@@ -3291,6 +4232,13 @@
   <p:clrMapOvr>
     <a:masterClrMapping/>
   </p:clrMapOvr>
+  <p:timing>
+    <p:tnLst>
+      <p:par>
+        <p:cTn id="1" dur="indefinite" restart="never" nodeType="tmRoot"/>
+      </p:par>
+    </p:tnLst>
+  </p:timing>
 </p:sld>
 </file>
 
@@ -3358,12 +4306,8 @@
           </a:p>
           <a:p>
             <a:r>
-              <a:rPr lang="en-US" dirty="0" err="1" smtClean="0"/>
-              <a:t>Kivy</a:t>
-            </a:r>
-            <a:r>
               <a:rPr lang="en-US" dirty="0" smtClean="0"/>
-              <a:t> is the GUI for a python powered app.</a:t>
+              <a:t>Kivy is the GUI for a python powered app.</a:t>
             </a:r>
           </a:p>
           <a:p>
@@ -3439,6 +4383,13 @@
   <p:clrMapOvr>
     <a:masterClrMapping/>
   </p:clrMapOvr>
+  <p:timing>
+    <p:tnLst>
+      <p:par>
+        <p:cTn id="1" dur="indefinite" restart="never" nodeType="tmRoot"/>
+      </p:par>
+    </p:tnLst>
+  </p:timing>
 </p:sld>
 </file>
 
@@ -3549,6 +4500,13 @@
   <p:clrMapOvr>
     <a:masterClrMapping/>
   </p:clrMapOvr>
+  <p:timing>
+    <p:tnLst>
+      <p:par>
+        <p:cTn id="1" dur="indefinite" restart="never" nodeType="tmRoot"/>
+      </p:par>
+    </p:tnLst>
+  </p:timing>
 </p:sld>
 </file>
 
@@ -3585,12 +4543,8 @@
           <a:lstStyle/>
           <a:p>
             <a:r>
-              <a:rPr lang="en-US" dirty="0" err="1" smtClean="0"/>
-              <a:t>Kivy</a:t>
-            </a:r>
-            <a:r>
               <a:rPr lang="en-US" dirty="0" smtClean="0"/>
-              <a:t> App</a:t>
+              <a:t>Kivy App</a:t>
             </a:r>
             <a:endParaRPr lang="en-IN" dirty="0"/>
           </a:p>
@@ -3620,7 +4574,7 @@
               <a:t>kivy</a:t>
             </a:r>
             <a:r>
-              <a:rPr lang="en-US" smtClean="0"/>
+              <a:rPr lang="en-US" dirty="0" smtClean="0"/>
               <a:t> running app.</a:t>
             </a:r>
           </a:p>
@@ -3636,6 +4590,568 @@
   <p:clrMapOvr>
     <a:masterClrMapping/>
   </p:clrMapOvr>
+  <p:timing>
+    <p:tnLst>
+      <p:par>
+        <p:cTn id="1" dur="indefinite" restart="never" nodeType="tmRoot"/>
+      </p:par>
+    </p:tnLst>
+  </p:timing>
+</p:sld>
+</file>
+
+<file path=ppt/slides/slide6.xml><?xml version="1.0" encoding="utf-8"?>
+<p:sld xmlns:a="http://schemas.openxmlformats.org/drawingml/2006/main" xmlns:r="http://schemas.openxmlformats.org/officeDocument/2006/relationships" xmlns:p="http://schemas.openxmlformats.org/presentationml/2006/main">
+  <p:cSld>
+    <p:spTree>
+      <p:nvGrpSpPr>
+        <p:cNvPr id="1" name=""/>
+        <p:cNvGrpSpPr/>
+        <p:nvPr/>
+      </p:nvGrpSpPr>
+      <p:grpSpPr>
+        <a:xfrm>
+          <a:off x="0" y="0"/>
+          <a:ext cx="0" cy="0"/>
+          <a:chOff x="0" y="0"/>
+          <a:chExt cx="0" cy="0"/>
+        </a:xfrm>
+      </p:grpSpPr>
+      <p:sp>
+        <p:nvSpPr>
+          <p:cNvPr id="2" name="Title 1"/>
+          <p:cNvSpPr>
+            <a:spLocks noGrp="1"/>
+          </p:cNvSpPr>
+          <p:nvPr>
+            <p:ph type="title"/>
+          </p:nvPr>
+        </p:nvSpPr>
+        <p:spPr>
+          <a:xfrm>
+            <a:off x="467544" y="5439"/>
+            <a:ext cx="8229600" cy="1143000"/>
+          </a:xfrm>
+        </p:spPr>
+        <p:txBody>
+          <a:bodyPr/>
+          <a:lstStyle/>
+          <a:p>
+            <a:r>
+              <a:rPr lang="en-US" dirty="0" smtClean="0"/>
+              <a:t>Lifecycle of App</a:t>
+            </a:r>
+            <a:endParaRPr lang="en-IN" dirty="0"/>
+          </a:p>
+        </p:txBody>
+      </p:sp>
+      <p:pic>
+        <p:nvPicPr>
+          <p:cNvPr id="4" name="Content Placeholder 3"/>
+          <p:cNvPicPr>
+            <a:picLocks noGrp="1" noChangeAspect="1"/>
+          </p:cNvPicPr>
+          <p:nvPr>
+            <p:ph idx="1"/>
+          </p:nvPr>
+        </p:nvPicPr>
+        <p:blipFill>
+          <a:blip r:embed="rId2">
+            <a:extLst>
+              <a:ext uri="{28A0092B-C50C-407E-A947-70E740481C1C}">
+                <a14:useLocalDpi xmlns:a14="http://schemas.microsoft.com/office/drawing/2010/main" val="0"/>
+              </a:ext>
+            </a:extLst>
+          </a:blip>
+          <a:stretch>
+            <a:fillRect/>
+          </a:stretch>
+        </p:blipFill>
+        <p:spPr>
+          <a:xfrm>
+            <a:off x="1115617" y="1127418"/>
+            <a:ext cx="6840760" cy="5414534"/>
+          </a:xfrm>
+        </p:spPr>
+      </p:pic>
+    </p:spTree>
+    <p:extLst>
+      <p:ext uri="{BB962C8B-B14F-4D97-AF65-F5344CB8AC3E}">
+        <p14:creationId xmlns:p14="http://schemas.microsoft.com/office/powerpoint/2010/main" val="1699088876"/>
+      </p:ext>
+    </p:extLst>
+  </p:cSld>
+  <p:clrMapOvr>
+    <a:masterClrMapping/>
+  </p:clrMapOvr>
+  <p:timing>
+    <p:tnLst>
+      <p:par>
+        <p:cTn id="1" dur="indefinite" restart="never" nodeType="tmRoot"/>
+      </p:par>
+    </p:tnLst>
+  </p:timing>
+</p:sld>
+</file>
+
+<file path=ppt/slides/slide7.xml><?xml version="1.0" encoding="utf-8"?>
+<p:sld xmlns:a="http://schemas.openxmlformats.org/drawingml/2006/main" xmlns:r="http://schemas.openxmlformats.org/officeDocument/2006/relationships" xmlns:p="http://schemas.openxmlformats.org/presentationml/2006/main">
+  <p:cSld>
+    <p:spTree>
+      <p:nvGrpSpPr>
+        <p:cNvPr id="1" name=""/>
+        <p:cNvGrpSpPr/>
+        <p:nvPr/>
+      </p:nvGrpSpPr>
+      <p:grpSpPr>
+        <a:xfrm>
+          <a:off x="0" y="0"/>
+          <a:ext cx="0" cy="0"/>
+          <a:chOff x="0" y="0"/>
+          <a:chExt cx="0" cy="0"/>
+        </a:xfrm>
+      </p:grpSpPr>
+      <p:sp>
+        <p:nvSpPr>
+          <p:cNvPr id="2" name="Title 1"/>
+          <p:cNvSpPr>
+            <a:spLocks noGrp="1"/>
+          </p:cNvSpPr>
+          <p:nvPr>
+            <p:ph type="title"/>
+          </p:nvPr>
+        </p:nvSpPr>
+        <p:spPr/>
+        <p:txBody>
+          <a:bodyPr/>
+          <a:lstStyle/>
+          <a:p>
+            <a:r>
+              <a:rPr lang="en-US" dirty="0" smtClean="0"/>
+              <a:t>Events in Kivy</a:t>
+            </a:r>
+            <a:endParaRPr lang="en-IN" dirty="0"/>
+          </a:p>
+        </p:txBody>
+      </p:sp>
+      <p:sp>
+        <p:nvSpPr>
+          <p:cNvPr id="3" name="Content Placeholder 2"/>
+          <p:cNvSpPr>
+            <a:spLocks noGrp="1"/>
+          </p:cNvSpPr>
+          <p:nvPr>
+            <p:ph idx="1"/>
+          </p:nvPr>
+        </p:nvSpPr>
+        <p:spPr>
+          <a:xfrm>
+            <a:off x="467544" y="2204864"/>
+            <a:ext cx="8229600" cy="4525963"/>
+          </a:xfrm>
+        </p:spPr>
+        <p:txBody>
+          <a:bodyPr/>
+          <a:lstStyle/>
+          <a:p>
+            <a:r>
+              <a:rPr lang="en-US" dirty="0" smtClean="0"/>
+              <a:t>EventDispatcher class (Widget, Animation, Clock)</a:t>
+            </a:r>
+          </a:p>
+          <a:p>
+            <a:r>
+              <a:rPr lang="en-US" dirty="0" smtClean="0"/>
+              <a:t>Clock events </a:t>
+            </a:r>
+          </a:p>
+          <a:p>
+            <a:r>
+              <a:rPr lang="en-US" dirty="0" smtClean="0"/>
+              <a:t>Callbacks</a:t>
+            </a:r>
+          </a:p>
+          <a:p>
+            <a:r>
+              <a:rPr lang="en-US" dirty="0" smtClean="0"/>
+              <a:t>Using </a:t>
+            </a:r>
+            <a:r>
+              <a:rPr lang="en-IN" dirty="0"/>
+              <a:t>Properties</a:t>
+            </a:r>
+          </a:p>
+          <a:p>
+            <a:endParaRPr lang="en-US" dirty="0" smtClean="0"/>
+          </a:p>
+          <a:p>
+            <a:endParaRPr lang="en-IN" dirty="0"/>
+          </a:p>
+        </p:txBody>
+      </p:sp>
+    </p:spTree>
+    <p:extLst>
+      <p:ext uri="{BB962C8B-B14F-4D97-AF65-F5344CB8AC3E}">
+        <p14:creationId xmlns:p14="http://schemas.microsoft.com/office/powerpoint/2010/main" val="3096920346"/>
+      </p:ext>
+    </p:extLst>
+  </p:cSld>
+  <p:clrMapOvr>
+    <a:masterClrMapping/>
+  </p:clrMapOvr>
+  <p:timing>
+    <p:tnLst>
+      <p:par>
+        <p:cTn id="1" dur="indefinite" restart="never" nodeType="tmRoot"/>
+      </p:par>
+    </p:tnLst>
+  </p:timing>
+</p:sld>
+</file>
+
+<file path=ppt/slides/slide8.xml><?xml version="1.0" encoding="utf-8"?>
+<p:sld xmlns:a="http://schemas.openxmlformats.org/drawingml/2006/main" xmlns:r="http://schemas.openxmlformats.org/officeDocument/2006/relationships" xmlns:p="http://schemas.openxmlformats.org/presentationml/2006/main">
+  <p:cSld>
+    <p:spTree>
+      <p:nvGrpSpPr>
+        <p:cNvPr id="1" name=""/>
+        <p:cNvGrpSpPr/>
+        <p:nvPr/>
+      </p:nvGrpSpPr>
+      <p:grpSpPr>
+        <a:xfrm>
+          <a:off x="0" y="0"/>
+          <a:ext cx="0" cy="0"/>
+          <a:chOff x="0" y="0"/>
+          <a:chExt cx="0" cy="0"/>
+        </a:xfrm>
+      </p:grpSpPr>
+      <p:sp>
+        <p:nvSpPr>
+          <p:cNvPr id="2" name="Title 1"/>
+          <p:cNvSpPr>
+            <a:spLocks noGrp="1"/>
+          </p:cNvSpPr>
+          <p:nvPr>
+            <p:ph type="title"/>
+          </p:nvPr>
+        </p:nvSpPr>
+        <p:spPr/>
+        <p:txBody>
+          <a:bodyPr/>
+          <a:lstStyle/>
+          <a:p>
+            <a:r>
+              <a:rPr lang="en-US" dirty="0" smtClean="0"/>
+              <a:t>Input in Kivy</a:t>
+            </a:r>
+            <a:endParaRPr lang="en-IN" dirty="0"/>
+          </a:p>
+        </p:txBody>
+      </p:sp>
+      <p:sp>
+        <p:nvSpPr>
+          <p:cNvPr id="3" name="Content Placeholder 2"/>
+          <p:cNvSpPr>
+            <a:spLocks noGrp="1"/>
+          </p:cNvSpPr>
+          <p:nvPr>
+            <p:ph idx="1"/>
+          </p:nvPr>
+        </p:nvSpPr>
+        <p:spPr/>
+        <p:txBody>
+          <a:bodyPr/>
+          <a:lstStyle/>
+          <a:p>
+            <a:r>
+              <a:rPr lang="en-US" dirty="0" smtClean="0"/>
+              <a:t>Kivy can handle </a:t>
+            </a:r>
+            <a:r>
+              <a:rPr lang="en-IN" dirty="0"/>
+              <a:t>mouse, touchscreen, accelerometer, gyroscope, etc</a:t>
+            </a:r>
+            <a:r>
+              <a:rPr lang="en-IN" dirty="0" smtClean="0"/>
+              <a:t>.</a:t>
+            </a:r>
+          </a:p>
+          <a:p>
+            <a:pPr marL="0" indent="0">
+              <a:buNone/>
+            </a:pPr>
+            <a:endParaRPr lang="en-IN" dirty="0" smtClean="0"/>
+          </a:p>
+          <a:p>
+            <a:pPr marL="0" indent="0">
+              <a:buNone/>
+            </a:pPr>
+            <a:r>
+              <a:rPr lang="en-GB" dirty="0" smtClean="0"/>
+              <a:t>		       </a:t>
+            </a:r>
+            <a:r>
+              <a:rPr lang="en-GB" sz="2800" u="sng" dirty="0" smtClean="0"/>
+              <a:t>Global Architecture</a:t>
+            </a:r>
+          </a:p>
+          <a:p>
+            <a:pPr marL="0" indent="0">
+              <a:buNone/>
+            </a:pPr>
+            <a:endParaRPr lang="en-GB" sz="1000" u="sng" dirty="0" smtClean="0"/>
+          </a:p>
+          <a:p>
+            <a:pPr marL="0" indent="0">
+              <a:buNone/>
+            </a:pPr>
+            <a:r>
+              <a:rPr lang="en-GB" sz="2000" dirty="0" smtClean="0"/>
+              <a:t>Input </a:t>
+            </a:r>
+            <a:r>
+              <a:rPr lang="en-GB" sz="2000" dirty="0"/>
+              <a:t>providers</a:t>
+            </a:r>
+            <a:r>
+              <a:rPr lang="en-GB" sz="2000" dirty="0" smtClean="0"/>
+              <a:t> </a:t>
+            </a:r>
+            <a:r>
+              <a:rPr lang="en-GB" sz="2000" dirty="0"/>
+              <a:t>-&gt;</a:t>
+            </a:r>
+            <a:r>
+              <a:rPr lang="en-GB" sz="2000" dirty="0" smtClean="0"/>
+              <a:t> </a:t>
+            </a:r>
+            <a:r>
+              <a:rPr lang="en-GB" sz="2000" dirty="0"/>
+              <a:t>Motion</a:t>
+            </a:r>
+            <a:r>
+              <a:rPr lang="en-GB" sz="2000" dirty="0" smtClean="0"/>
+              <a:t> event </a:t>
+            </a:r>
+            <a:r>
+              <a:rPr lang="en-GB" sz="2000" dirty="0"/>
+              <a:t>-&gt;</a:t>
+            </a:r>
+            <a:r>
+              <a:rPr lang="en-GB" sz="2000" dirty="0" smtClean="0"/>
+              <a:t> </a:t>
+            </a:r>
+            <a:r>
+              <a:rPr lang="en-GB" sz="2000" dirty="0"/>
+              <a:t>Post</a:t>
+            </a:r>
+            <a:r>
+              <a:rPr lang="en-GB" sz="2000" dirty="0" smtClean="0"/>
+              <a:t> </a:t>
+            </a:r>
+            <a:r>
+              <a:rPr lang="en-GB" sz="2000" dirty="0"/>
+              <a:t>processing</a:t>
+            </a:r>
+            <a:r>
+              <a:rPr lang="en-GB" sz="2000" dirty="0" smtClean="0"/>
+              <a:t> </a:t>
+            </a:r>
+            <a:r>
+              <a:rPr lang="en-GB" sz="2000" dirty="0"/>
+              <a:t>-&gt;</a:t>
+            </a:r>
+            <a:r>
+              <a:rPr lang="en-GB" sz="2000" dirty="0" smtClean="0"/>
+              <a:t> </a:t>
+            </a:r>
+            <a:r>
+              <a:rPr lang="en-GB" sz="2000" dirty="0"/>
+              <a:t>Dispatch</a:t>
+            </a:r>
+            <a:r>
+              <a:rPr lang="en-GB" sz="2000" dirty="0" smtClean="0"/>
+              <a:t> </a:t>
+            </a:r>
+            <a:r>
+              <a:rPr lang="en-GB" sz="2000" dirty="0"/>
+              <a:t>to</a:t>
+            </a:r>
+            <a:r>
+              <a:rPr lang="en-GB" sz="2000" dirty="0" smtClean="0"/>
+              <a:t> Window</a:t>
+            </a:r>
+          </a:p>
+          <a:p>
+            <a:pPr marL="0" indent="0">
+              <a:buNone/>
+            </a:pPr>
+            <a:endParaRPr lang="en-GB" sz="2000" dirty="0" smtClean="0"/>
+          </a:p>
+          <a:p>
+            <a:r>
+              <a:rPr lang="en-GB" dirty="0" smtClean="0"/>
+              <a:t>Touch events - Lets see the code.</a:t>
+            </a:r>
+            <a:endParaRPr lang="en-US" dirty="0" smtClean="0"/>
+          </a:p>
+        </p:txBody>
+      </p:sp>
+    </p:spTree>
+    <p:extLst>
+      <p:ext uri="{BB962C8B-B14F-4D97-AF65-F5344CB8AC3E}">
+        <p14:creationId xmlns:p14="http://schemas.microsoft.com/office/powerpoint/2010/main" val="498997281"/>
+      </p:ext>
+    </p:extLst>
+  </p:cSld>
+  <p:clrMapOvr>
+    <a:masterClrMapping/>
+  </p:clrMapOvr>
+  <p:timing>
+    <p:tnLst>
+      <p:par>
+        <p:cTn id="1" dur="indefinite" restart="never" nodeType="tmRoot"/>
+      </p:par>
+    </p:tnLst>
+  </p:timing>
+</p:sld>
+</file>
+
+<file path=ppt/slides/slide9.xml><?xml version="1.0" encoding="utf-8"?>
+<p:sld xmlns:a="http://schemas.openxmlformats.org/drawingml/2006/main" xmlns:r="http://schemas.openxmlformats.org/officeDocument/2006/relationships" xmlns:p="http://schemas.openxmlformats.org/presentationml/2006/main">
+  <p:cSld>
+    <p:spTree>
+      <p:nvGrpSpPr>
+        <p:cNvPr id="1" name=""/>
+        <p:cNvGrpSpPr/>
+        <p:nvPr/>
+      </p:nvGrpSpPr>
+      <p:grpSpPr>
+        <a:xfrm>
+          <a:off x="0" y="0"/>
+          <a:ext cx="0" cy="0"/>
+          <a:chOff x="0" y="0"/>
+          <a:chExt cx="0" cy="0"/>
+        </a:xfrm>
+      </p:grpSpPr>
+      <p:sp>
+        <p:nvSpPr>
+          <p:cNvPr id="2" name="Title 1"/>
+          <p:cNvSpPr>
+            <a:spLocks noGrp="1"/>
+          </p:cNvSpPr>
+          <p:nvPr>
+            <p:ph type="title"/>
+          </p:nvPr>
+        </p:nvSpPr>
+        <p:spPr/>
+        <p:txBody>
+          <a:bodyPr/>
+          <a:lstStyle/>
+          <a:p>
+            <a:r>
+              <a:rPr lang="en-US" dirty="0" smtClean="0"/>
+              <a:t>Widgets</a:t>
+            </a:r>
+            <a:endParaRPr lang="en-IN" dirty="0"/>
+          </a:p>
+        </p:txBody>
+      </p:sp>
+      <p:sp>
+        <p:nvSpPr>
+          <p:cNvPr id="3" name="Content Placeholder 2"/>
+          <p:cNvSpPr>
+            <a:spLocks noGrp="1"/>
+          </p:cNvSpPr>
+          <p:nvPr>
+            <p:ph idx="1"/>
+          </p:nvPr>
+        </p:nvSpPr>
+        <p:spPr/>
+        <p:txBody>
+          <a:bodyPr>
+            <a:normAutofit lnSpcReduction="10000"/>
+          </a:bodyPr>
+          <a:lstStyle/>
+          <a:p>
+            <a:r>
+              <a:rPr lang="en-GB" dirty="0" smtClean="0"/>
+              <a:t>A widget</a:t>
+            </a:r>
+            <a:r>
+              <a:rPr lang="en-GB" dirty="0"/>
+              <a:t> is the base building block of GUI interfaces in Kivy</a:t>
+            </a:r>
+            <a:r>
+              <a:rPr lang="en-GB" dirty="0" smtClean="0"/>
+              <a:t>.</a:t>
+            </a:r>
+          </a:p>
+          <a:p>
+            <a:r>
+              <a:rPr lang="en-GB" dirty="0" smtClean="0"/>
+              <a:t>Provides Canvas, receives events and reacts.</a:t>
+            </a:r>
+          </a:p>
+          <a:p>
+            <a:r>
+              <a:rPr lang="en-GB" dirty="0" smtClean="0"/>
+              <a:t>Widgets are organised in a tree structure.</a:t>
+            </a:r>
+          </a:p>
+          <a:p>
+            <a:r>
+              <a:rPr lang="en-GB" dirty="0" smtClean="0"/>
+              <a:t>root widget and children</a:t>
+            </a:r>
+          </a:p>
+          <a:p>
+            <a:r>
+              <a:rPr lang="en-GB" dirty="0" smtClean="0"/>
+              <a:t>add_widget()</a:t>
+            </a:r>
+          </a:p>
+          <a:p>
+            <a:r>
+              <a:rPr lang="en-GB" dirty="0"/>
+              <a:t>r</a:t>
+            </a:r>
+            <a:r>
+              <a:rPr lang="en-GB" dirty="0" smtClean="0"/>
+              <a:t>emove_widget()</a:t>
+            </a:r>
+          </a:p>
+          <a:p>
+            <a:r>
+              <a:rPr lang="en-GB" dirty="0"/>
+              <a:t>c</a:t>
+            </a:r>
+            <a:r>
+              <a:rPr lang="en-GB" dirty="0" smtClean="0"/>
+              <a:t>lear_widgets()</a:t>
+            </a:r>
+            <a:endParaRPr lang="en-IN" dirty="0"/>
+          </a:p>
+        </p:txBody>
+      </p:sp>
+    </p:spTree>
+    <p:extLst>
+      <p:ext uri="{BB962C8B-B14F-4D97-AF65-F5344CB8AC3E}">
+        <p14:creationId xmlns:p14="http://schemas.microsoft.com/office/powerpoint/2010/main" val="4124033609"/>
+      </p:ext>
+    </p:extLst>
+  </p:cSld>
+  <p:clrMapOvr>
+    <a:masterClrMapping/>
+  </p:clrMapOvr>
+  <p:timing>
+    <p:tnLst>
+      <p:par>
+        <p:cTn id="1" dur="indefinite" restart="never" nodeType="tmRoot"/>
+      </p:par>
+    </p:tnLst>
+  </p:timing>
 </p:sld>
 </file>
 

</xml_diff>